<commit_message>
Mod 6 last changes
</commit_message>
<xml_diff>
--- a/Slides/Module 6.pptx
+++ b/Slides/Module 6.pptx
@@ -4370,14 +4370,10 @@
           <a:p>
             <a:r>
               <a:rPr lang="en-US" sz="2800" b="0" dirty="0" smtClean="0"/>
-              <a:t>Supported by Compass, </a:t>
-            </a:r>
-            <a:r>
-              <a:rPr lang="en-US" sz="2800" b="0" smtClean="0"/>
-              <a:t>a </a:t>
-            </a:r>
-            <a:r>
-              <a:rPr lang="en-US" sz="2800" b="0" smtClean="0"/>
+              <a:t>Supported by Compass, a </a:t>
+            </a:r>
+            <a:r>
+              <a:rPr lang="en-US" sz="2800" b="0" dirty="0" smtClean="0"/>
               <a:t>hugely </a:t>
             </a:r>
             <a:r>
@@ -4601,7 +4597,11 @@
           <a:p>
             <a:r>
               <a:rPr lang="en-US" sz="2800" b="0" dirty="0" smtClean="0"/>
-              <a:t>Conservative but wise about features</a:t>
+              <a:t>Conservative (but wise) </a:t>
+            </a:r>
+            <a:r>
+              <a:rPr lang="en-US" sz="2800" b="0" dirty="0" smtClean="0"/>
+              <a:t>about features</a:t>
             </a:r>
           </a:p>
           <a:p>

</xml_diff>